<commit_message>
final pptx & pdf
</commit_message>
<xml_diff>
--- a/Pitch_Rsikognize_Vision.pptx
+++ b/Pitch_Rsikognize_Vision.pptx
@@ -5,13 +5,12 @@
     <p:sldMasterId id="2147483648" r:id="rId1"/>
   </p:sldMasterIdLst>
   <p:notesMasterIdLst>
-    <p:notesMasterId r:id="rId6"/>
+    <p:notesMasterId r:id="rId5"/>
   </p:notesMasterIdLst>
   <p:sldIdLst>
     <p:sldId id="256" r:id="rId2"/>
     <p:sldId id="267" r:id="rId3"/>
     <p:sldId id="266" r:id="rId4"/>
-    <p:sldId id="265" r:id="rId5"/>
   </p:sldIdLst>
   <p:sldSz cx="12192000" cy="6858000"/>
   <p:notesSz cx="6858000" cy="9144000"/>
@@ -545,6 +544,90 @@
     <p:extLst>
       <p:ext uri="{BB962C8B-B14F-4D97-AF65-F5344CB8AC3E}">
         <p14:creationId xmlns:p14="http://schemas.microsoft.com/office/powerpoint/2010/main" val="278722862"/>
+      </p:ext>
+    </p:extLst>
+  </p:cSld>
+  <p:clrMapOvr>
+    <a:masterClrMapping/>
+  </p:clrMapOvr>
+</p:notes>
+</file>
+
+<file path=ppt/notesSlides/notesSlide2.xml><?xml version="1.0" encoding="utf-8"?>
+<p:notes xmlns:a="http://schemas.openxmlformats.org/drawingml/2006/main" xmlns:r="http://schemas.openxmlformats.org/officeDocument/2006/relationships" xmlns:p="http://schemas.openxmlformats.org/presentationml/2006/main">
+  <p:cSld>
+    <p:spTree>
+      <p:nvGrpSpPr>
+        <p:cNvPr id="1" name=""/>
+        <p:cNvGrpSpPr/>
+        <p:nvPr/>
+      </p:nvGrpSpPr>
+      <p:grpSpPr>
+        <a:xfrm>
+          <a:off x="0" y="0"/>
+          <a:ext cx="0" cy="0"/>
+          <a:chOff x="0" y="0"/>
+          <a:chExt cx="0" cy="0"/>
+        </a:xfrm>
+      </p:grpSpPr>
+      <p:sp>
+        <p:nvSpPr>
+          <p:cNvPr id="2" name="Folienbildplatzhalter 1"/>
+          <p:cNvSpPr>
+            <a:spLocks noGrp="1" noRot="1" noChangeAspect="1"/>
+          </p:cNvSpPr>
+          <p:nvPr>
+            <p:ph type="sldImg"/>
+          </p:nvPr>
+        </p:nvSpPr>
+        <p:spPr/>
+      </p:sp>
+      <p:sp>
+        <p:nvSpPr>
+          <p:cNvPr id="3" name="Notizenplatzhalter 2"/>
+          <p:cNvSpPr>
+            <a:spLocks noGrp="1"/>
+          </p:cNvSpPr>
+          <p:nvPr>
+            <p:ph type="body" idx="1"/>
+          </p:nvPr>
+        </p:nvSpPr>
+        <p:spPr/>
+        <p:txBody>
+          <a:bodyPr/>
+          <a:lstStyle/>
+          <a:p>
+            <a:endParaRPr lang="en-US" dirty="0"/>
+          </a:p>
+        </p:txBody>
+      </p:sp>
+      <p:sp>
+        <p:nvSpPr>
+          <p:cNvPr id="4" name="Foliennummernplatzhalter 3"/>
+          <p:cNvSpPr>
+            <a:spLocks noGrp="1"/>
+          </p:cNvSpPr>
+          <p:nvPr>
+            <p:ph type="sldNum" sz="quarter" idx="10"/>
+          </p:nvPr>
+        </p:nvSpPr>
+        <p:spPr/>
+        <p:txBody>
+          <a:bodyPr/>
+          <a:lstStyle/>
+          <a:p>
+            <a:fld id="{3BCE33BD-C99D-B344-82D0-E9A7DACC034E}" type="slidenum">
+              <a:rPr lang="de-DE" smtClean="0"/>
+              <a:t>3</a:t>
+            </a:fld>
+            <a:endParaRPr lang="de-DE"/>
+          </a:p>
+        </p:txBody>
+      </p:sp>
+    </p:spTree>
+    <p:extLst>
+      <p:ext uri="{BB962C8B-B14F-4D97-AF65-F5344CB8AC3E}">
+        <p14:creationId xmlns:p14="http://schemas.microsoft.com/office/powerpoint/2010/main" val="2778286981"/>
       </p:ext>
     </p:extLst>
   </p:cSld>
@@ -6307,6 +6390,30 @@
           <a:chExt cx="0" cy="0"/>
         </a:xfrm>
       </p:grpSpPr>
+      <p:pic>
+        <p:nvPicPr>
+          <p:cNvPr id="9" name="Grafik 8"/>
+          <p:cNvPicPr>
+            <a:picLocks noChangeAspect="1"/>
+          </p:cNvPicPr>
+          <p:nvPr/>
+        </p:nvPicPr>
+        <p:blipFill>
+          <a:blip r:embed="rId3"/>
+          <a:stretch>
+            <a:fillRect/>
+          </a:stretch>
+        </p:blipFill>
+        <p:spPr>
+          <a:xfrm rot="1971212">
+            <a:off x="4304746" y="2003449"/>
+            <a:ext cx="900502" cy="672545"/>
+          </a:xfrm>
+          <a:prstGeom prst="rect">
+            <a:avLst/>
+          </a:prstGeom>
+        </p:spPr>
+      </p:pic>
       <p:sp>
         <p:nvSpPr>
           <p:cNvPr id="2" name="Titel 1"/>
@@ -6319,7 +6426,7 @@
         </p:nvSpPr>
         <p:spPr>
           <a:xfrm>
-            <a:off x="1087437" y="431800"/>
+            <a:off x="1087436" y="446088"/>
             <a:ext cx="3547533" cy="1618396"/>
           </a:xfrm>
         </p:spPr>
@@ -6328,14 +6435,6 @@
           <a:lstStyle/>
           <a:p>
             <a:pPr algn="ctr"/>
-            <a:r>
-              <a:rPr lang="de-DE" sz="2800" dirty="0"/>
-              <a:t>Target </a:t>
-            </a:r>
-            <a:r>
-              <a:rPr lang="de-DE" sz="2800" dirty="0" err="1"/>
-              <a:t>group</a:t>
-            </a:r>
             <a:br>
               <a:rPr lang="de-DE" sz="2800" dirty="0"/>
             </a:br>
@@ -6474,11 +6573,8 @@
             </a:r>
             <a:r>
               <a:rPr lang="de-DE" dirty="0"/>
-              <a:t>:</a:t>
-            </a:r>
-          </a:p>
-          <a:p>
-            <a:pPr lvl="1"/>
+              <a:t>: </a:t>
+            </a:r>
             <a:r>
               <a:rPr lang="de-DE" dirty="0" err="1"/>
               <a:t>Risk</a:t>
@@ -6497,18 +6593,42 @@
             </a:r>
             <a:r>
               <a:rPr lang="de-DE" dirty="0" err="1"/>
-              <a:t>creation</a:t>
+              <a:t>as</a:t>
+            </a:r>
+            <a:r>
+              <a:rPr lang="de-DE" dirty="0"/>
+              <a:t> easy </a:t>
+            </a:r>
+            <a:r>
+              <a:rPr lang="de-DE" dirty="0" err="1"/>
+              <a:t>as</a:t>
+            </a:r>
+            <a:r>
+              <a:rPr lang="de-DE" dirty="0"/>
+              <a:t>  „</a:t>
+            </a:r>
+            <a:r>
+              <a:rPr lang="de-DE" dirty="0" err="1"/>
+              <a:t>Where‘s</a:t>
+            </a:r>
+            <a:r>
+              <a:rPr lang="de-DE" dirty="0"/>
+              <a:t> Wally“?</a:t>
+            </a:r>
+          </a:p>
+          <a:p>
+            <a:pPr lvl="1"/>
+            <a:r>
+              <a:rPr lang="de-DE" dirty="0" err="1"/>
+              <a:t>Risk</a:t>
             </a:r>
             <a:r>
               <a:rPr lang="de-DE" dirty="0"/>
               <a:t> </a:t>
             </a:r>
-          </a:p>
-          <a:p>
-            <a:pPr lvl="1"/>
             <a:r>
               <a:rPr lang="de-DE" dirty="0" err="1"/>
-              <a:t>application</a:t>
+              <a:t>awareness</a:t>
             </a:r>
             <a:r>
               <a:rPr lang="de-DE" dirty="0"/>
@@ -6516,6 +6636,25 @@
             </a:r>
             <a:r>
               <a:rPr lang="de-DE" dirty="0" err="1"/>
+              <a:t>creation</a:t>
+            </a:r>
+            <a:r>
+              <a:rPr lang="de-DE" dirty="0"/>
+              <a:t> </a:t>
+            </a:r>
+          </a:p>
+          <a:p>
+            <a:pPr lvl="1"/>
+            <a:r>
+              <a:rPr lang="de-DE" dirty="0" err="1"/>
+              <a:t>Application</a:t>
+            </a:r>
+            <a:r>
+              <a:rPr lang="de-DE" dirty="0"/>
+              <a:t> </a:t>
+            </a:r>
+            <a:r>
+              <a:rPr lang="de-DE" dirty="0" err="1"/>
               <a:t>for</a:t>
             </a:r>
             <a:r>
@@ -6550,7 +6689,7 @@
         </p:nvSpPr>
         <p:spPr>
           <a:xfrm>
-            <a:off x="1073151" y="3475182"/>
+            <a:off x="1001709" y="2462175"/>
             <a:ext cx="3547533" cy="3600311"/>
           </a:xfrm>
         </p:spPr>
@@ -6559,6 +6698,375 @@
           <a:lstStyle/>
           <a:p>
             <a:endParaRPr lang="de-DE" dirty="0"/>
+          </a:p>
+        </p:txBody>
+      </p:sp>
+      <p:sp>
+        <p:nvSpPr>
+          <p:cNvPr id="6" name="Textfeld 5"/>
+          <p:cNvSpPr txBox="1"/>
+          <p:nvPr/>
+        </p:nvSpPr>
+        <p:spPr>
+          <a:xfrm>
+            <a:off x="1001709" y="839787"/>
+            <a:ext cx="3866887" cy="830997"/>
+          </a:xfrm>
+          <a:prstGeom prst="rect">
+            <a:avLst/>
+          </a:prstGeom>
+          <a:noFill/>
+        </p:spPr>
+        <p:txBody>
+          <a:bodyPr wrap="square" rtlCol="0">
+            <a:spAutoFit/>
+          </a:bodyPr>
+          <a:lstStyle/>
+          <a:p>
+            <a:r>
+              <a:rPr lang="de-DE" sz="4800" b="1" dirty="0">
+                <a:solidFill>
+                  <a:srgbClr val="FEFEFE"/>
+                </a:solidFill>
+                <a:ea typeface="+mj-ea"/>
+                <a:cs typeface="+mj-cs"/>
+              </a:rPr>
+              <a:t>RIS</a:t>
+            </a:r>
+            <a:r>
+              <a:rPr lang="de-DE" sz="4800" b="1" dirty="0">
+                <a:solidFill>
+                  <a:srgbClr val="FF0000"/>
+                </a:solidFill>
+                <a:ea typeface="+mj-ea"/>
+                <a:cs typeface="+mj-cs"/>
+              </a:rPr>
+              <a:t>K</a:t>
+            </a:r>
+            <a:r>
+              <a:rPr lang="de-DE" sz="4800" b="1" dirty="0">
+                <a:solidFill>
+                  <a:srgbClr val="FEFEFE"/>
+                </a:solidFill>
+                <a:ea typeface="+mj-ea"/>
+                <a:cs typeface="+mj-cs"/>
+              </a:rPr>
+              <a:t>OGNIZE</a:t>
+            </a:r>
+            <a:endParaRPr lang="en-US" sz="4800" dirty="0"/>
+          </a:p>
+        </p:txBody>
+      </p:sp>
+      <p:pic>
+        <p:nvPicPr>
+          <p:cNvPr id="11" name="Bild 10"/>
+          <p:cNvPicPr>
+            <a:picLocks noChangeAspect="1"/>
+          </p:cNvPicPr>
+          <p:nvPr/>
+        </p:nvPicPr>
+        <p:blipFill>
+          <a:blip r:embed="rId4">
+            <a:extLst>
+              <a:ext uri="{28A0092B-C50C-407E-A947-70E740481C1C}">
+                <a14:useLocalDpi xmlns:a14="http://schemas.microsoft.com/office/drawing/2010/main" val="0"/>
+              </a:ext>
+            </a:extLst>
+          </a:blip>
+          <a:stretch>
+            <a:fillRect/>
+          </a:stretch>
+        </p:blipFill>
+        <p:spPr>
+          <a:xfrm>
+            <a:off x="915358" y="2412099"/>
+            <a:ext cx="3891687" cy="3700462"/>
+          </a:xfrm>
+          <a:prstGeom prst="rect">
+            <a:avLst/>
+          </a:prstGeom>
+        </p:spPr>
+      </p:pic>
+      <p:sp>
+        <p:nvSpPr>
+          <p:cNvPr id="12" name="Textplatzhalter 2"/>
+          <p:cNvSpPr txBox="1">
+            <a:spLocks/>
+          </p:cNvSpPr>
+          <p:nvPr/>
+        </p:nvSpPr>
+        <p:spPr>
+          <a:xfrm>
+            <a:off x="810000" y="6254750"/>
+            <a:ext cx="10561418" cy="433955"/>
+          </a:xfrm>
+          <a:prstGeom prst="rect">
+            <a:avLst/>
+          </a:prstGeom>
+          <a:effectLst>
+            <a:outerShdw blurRad="50800" dir="14400000">
+              <a:srgbClr val="000000">
+                <a:alpha val="40000"/>
+              </a:srgbClr>
+            </a:outerShdw>
+          </a:effectLst>
+        </p:spPr>
+        <p:txBody>
+          <a:bodyPr vert="horz" lIns="91440" tIns="45720" rIns="91440" bIns="45720" rtlCol="0" anchor="ctr">
+            <a:normAutofit/>
+          </a:bodyPr>
+          <a:lstStyle>
+            <a:lvl1pPr marL="342900" indent="-342900" algn="l" defTabSz="457200" rtl="0" eaLnBrk="1" latinLnBrk="0" hangingPunct="1">
+              <a:spcBef>
+                <a:spcPct val="20000"/>
+              </a:spcBef>
+              <a:spcAft>
+                <a:spcPts val="600"/>
+              </a:spcAft>
+              <a:buClr>
+                <a:schemeClr val="accent1"/>
+              </a:buClr>
+              <a:buFont typeface="Wingdings 2" charset="2"/>
+              <a:buChar char=""/>
+              <a:defRPr sz="1800" kern="1200">
+                <a:solidFill>
+                  <a:schemeClr val="tx1"/>
+                </a:solidFill>
+                <a:latin typeface="+mn-lt"/>
+                <a:ea typeface="+mn-ea"/>
+                <a:cs typeface="+mn-cs"/>
+              </a:defRPr>
+            </a:lvl1pPr>
+            <a:lvl2pPr marL="742950" indent="-285750" algn="l" defTabSz="457200" rtl="0" eaLnBrk="1" latinLnBrk="0" hangingPunct="1">
+              <a:spcBef>
+                <a:spcPct val="20000"/>
+              </a:spcBef>
+              <a:spcAft>
+                <a:spcPts val="600"/>
+              </a:spcAft>
+              <a:buClr>
+                <a:schemeClr val="accent1"/>
+              </a:buClr>
+              <a:buFont typeface="Wingdings 2" charset="2"/>
+              <a:buChar char=""/>
+              <a:defRPr sz="1600" kern="1200">
+                <a:solidFill>
+                  <a:schemeClr val="tx1"/>
+                </a:solidFill>
+                <a:latin typeface="+mn-lt"/>
+                <a:ea typeface="+mn-ea"/>
+                <a:cs typeface="+mn-cs"/>
+              </a:defRPr>
+            </a:lvl2pPr>
+            <a:lvl3pPr marL="1143000" indent="-228600" algn="l" defTabSz="457200" rtl="0" eaLnBrk="1" latinLnBrk="0" hangingPunct="1">
+              <a:spcBef>
+                <a:spcPct val="20000"/>
+              </a:spcBef>
+              <a:spcAft>
+                <a:spcPts val="600"/>
+              </a:spcAft>
+              <a:buClr>
+                <a:schemeClr val="accent1"/>
+              </a:buClr>
+              <a:buFont typeface="Wingdings 2" charset="2"/>
+              <a:buChar char=""/>
+              <a:defRPr sz="1400" kern="1200">
+                <a:solidFill>
+                  <a:schemeClr val="tx1"/>
+                </a:solidFill>
+                <a:latin typeface="+mn-lt"/>
+                <a:ea typeface="+mn-ea"/>
+                <a:cs typeface="+mn-cs"/>
+              </a:defRPr>
+            </a:lvl3pPr>
+            <a:lvl4pPr marL="1600200" indent="-228600" algn="l" defTabSz="457200" rtl="0" eaLnBrk="1" latinLnBrk="0" hangingPunct="1">
+              <a:spcBef>
+                <a:spcPct val="20000"/>
+              </a:spcBef>
+              <a:spcAft>
+                <a:spcPts val="600"/>
+              </a:spcAft>
+              <a:buClr>
+                <a:schemeClr val="accent1"/>
+              </a:buClr>
+              <a:buFont typeface="Wingdings 2" charset="2"/>
+              <a:buChar char=""/>
+              <a:defRPr sz="1200" kern="1200">
+                <a:solidFill>
+                  <a:schemeClr val="tx1"/>
+                </a:solidFill>
+                <a:latin typeface="+mn-lt"/>
+                <a:ea typeface="+mn-ea"/>
+                <a:cs typeface="+mn-cs"/>
+              </a:defRPr>
+            </a:lvl4pPr>
+            <a:lvl5pPr marL="2057400" indent="-228600" algn="l" defTabSz="457200" rtl="0" eaLnBrk="1" latinLnBrk="0" hangingPunct="1">
+              <a:spcBef>
+                <a:spcPct val="20000"/>
+              </a:spcBef>
+              <a:spcAft>
+                <a:spcPts val="600"/>
+              </a:spcAft>
+              <a:buClr>
+                <a:schemeClr val="accent1"/>
+              </a:buClr>
+              <a:buFont typeface="Wingdings 2" charset="2"/>
+              <a:buChar char=""/>
+              <a:defRPr sz="1200" kern="1200">
+                <a:solidFill>
+                  <a:schemeClr val="tx1"/>
+                </a:solidFill>
+                <a:latin typeface="+mn-lt"/>
+                <a:ea typeface="+mn-ea"/>
+                <a:cs typeface="+mn-cs"/>
+              </a:defRPr>
+            </a:lvl5pPr>
+            <a:lvl6pPr marL="2400000" indent="-228600" algn="l" defTabSz="457200" rtl="0" eaLnBrk="1" latinLnBrk="0" hangingPunct="1">
+              <a:spcBef>
+                <a:spcPct val="20000"/>
+              </a:spcBef>
+              <a:spcAft>
+                <a:spcPts val="600"/>
+              </a:spcAft>
+              <a:buClr>
+                <a:schemeClr val="accent1"/>
+              </a:buClr>
+              <a:buFont typeface="Wingdings 2" charset="2"/>
+              <a:buChar char=""/>
+              <a:defRPr sz="1200" kern="1200">
+                <a:solidFill>
+                  <a:schemeClr val="tx1"/>
+                </a:solidFill>
+                <a:latin typeface="+mn-lt"/>
+                <a:ea typeface="+mn-ea"/>
+                <a:cs typeface="+mn-cs"/>
+              </a:defRPr>
+            </a:lvl6pPr>
+            <a:lvl7pPr marL="2800000" indent="-228600" algn="l" defTabSz="457200" rtl="0" eaLnBrk="1" latinLnBrk="0" hangingPunct="1">
+              <a:spcBef>
+                <a:spcPct val="20000"/>
+              </a:spcBef>
+              <a:spcAft>
+                <a:spcPts val="600"/>
+              </a:spcAft>
+              <a:buClr>
+                <a:schemeClr val="accent1"/>
+              </a:buClr>
+              <a:buFont typeface="Wingdings 2" charset="2"/>
+              <a:buChar char=""/>
+              <a:defRPr sz="1200" kern="1200">
+                <a:solidFill>
+                  <a:schemeClr val="tx1"/>
+                </a:solidFill>
+                <a:latin typeface="+mn-lt"/>
+                <a:ea typeface="+mn-ea"/>
+                <a:cs typeface="+mn-cs"/>
+              </a:defRPr>
+            </a:lvl7pPr>
+            <a:lvl8pPr marL="3200000" indent="-228600" algn="l" defTabSz="457200" rtl="0" eaLnBrk="1" latinLnBrk="0" hangingPunct="1">
+              <a:spcBef>
+                <a:spcPct val="20000"/>
+              </a:spcBef>
+              <a:spcAft>
+                <a:spcPts val="600"/>
+              </a:spcAft>
+              <a:buClr>
+                <a:schemeClr val="accent1"/>
+              </a:buClr>
+              <a:buFont typeface="Wingdings 2" charset="2"/>
+              <a:buChar char=""/>
+              <a:defRPr sz="1200" kern="1200">
+                <a:solidFill>
+                  <a:schemeClr val="tx1"/>
+                </a:solidFill>
+                <a:latin typeface="+mn-lt"/>
+                <a:ea typeface="+mn-ea"/>
+                <a:cs typeface="+mn-cs"/>
+              </a:defRPr>
+            </a:lvl8pPr>
+            <a:lvl9pPr marL="3600000" indent="-228600" algn="l" defTabSz="457200" rtl="0" eaLnBrk="1" latinLnBrk="0" hangingPunct="1">
+              <a:spcBef>
+                <a:spcPct val="20000"/>
+              </a:spcBef>
+              <a:spcAft>
+                <a:spcPts val="600"/>
+              </a:spcAft>
+              <a:buClr>
+                <a:schemeClr val="accent1"/>
+              </a:buClr>
+              <a:buFont typeface="Wingdings 2" charset="2"/>
+              <a:buChar char=""/>
+              <a:defRPr sz="1200" kern="1200">
+                <a:solidFill>
+                  <a:schemeClr val="tx1"/>
+                </a:solidFill>
+                <a:latin typeface="+mn-lt"/>
+                <a:ea typeface="+mn-ea"/>
+                <a:cs typeface="+mn-cs"/>
+              </a:defRPr>
+            </a:lvl9pPr>
+          </a:lstStyle>
+          <a:p>
+            <a:pPr marL="0" indent="0">
+              <a:buNone/>
+            </a:pPr>
+            <a:r>
+              <a:rPr lang="de-DE" sz="1900" dirty="0" err="1"/>
+              <a:t>HackZurich</a:t>
+            </a:r>
+            <a:r>
+              <a:rPr lang="de-DE" sz="1900" dirty="0"/>
+              <a:t> 2016 . Team : Anton </a:t>
+            </a:r>
+            <a:r>
+              <a:rPr lang="de-DE" sz="1900" dirty="0" err="1"/>
+              <a:t>Dmitrijev</a:t>
+            </a:r>
+            <a:r>
+              <a:rPr lang="de-DE" sz="1900" dirty="0"/>
+              <a:t>, Dmitrij Burlak, Elisa </a:t>
+            </a:r>
+            <a:r>
+              <a:rPr lang="de-DE" sz="1900" dirty="0" err="1"/>
+              <a:t>Chiarelli</a:t>
+            </a:r>
+            <a:r>
+              <a:rPr lang="de-DE" sz="1900" dirty="0"/>
+              <a:t>, Melanie Langbein</a:t>
+            </a:r>
+          </a:p>
+        </p:txBody>
+      </p:sp>
+      <p:sp>
+        <p:nvSpPr>
+          <p:cNvPr id="10" name="Textfeld 9"/>
+          <p:cNvSpPr txBox="1"/>
+          <p:nvPr/>
+        </p:nvSpPr>
+        <p:spPr>
+          <a:xfrm>
+            <a:off x="829631" y="6600318"/>
+            <a:ext cx="10192908" cy="307777"/>
+          </a:xfrm>
+          <a:prstGeom prst="rect">
+            <a:avLst/>
+          </a:prstGeom>
+          <a:noFill/>
+        </p:spPr>
+        <p:txBody>
+          <a:bodyPr wrap="square" rtlCol="0">
+            <a:spAutoFit/>
+          </a:bodyPr>
+          <a:lstStyle/>
+          <a:p>
+            <a:r>
+              <a:rPr lang="en-US" sz="1400" dirty="0"/>
+              <a:t>*</a:t>
+            </a:r>
+            <a:r>
+              <a:rPr lang="en-US" sz="800" dirty="0"/>
+              <a:t> https://metrouk2.files.wordpress.com/2012/09/article-1346848996385-14d8f9fb000005dc-43911_636x475.jpg</a:t>
+            </a:r>
           </a:p>
         </p:txBody>
       </p:sp>
@@ -6572,191 +7080,81 @@
   <p:clrMapOvr>
     <a:masterClrMapping/>
   </p:clrMapOvr>
-</p:sld>
-</file>
-
-<file path=ppt/slides/slide4.xml><?xml version="1.0" encoding="utf-8"?>
-<p:sld xmlns:a="http://schemas.openxmlformats.org/drawingml/2006/main" xmlns:r="http://schemas.openxmlformats.org/officeDocument/2006/relationships" xmlns:p="http://schemas.openxmlformats.org/presentationml/2006/main">
-  <p:cSld>
-    <p:spTree>
-      <p:nvGrpSpPr>
-        <p:cNvPr id="1" name=""/>
-        <p:cNvGrpSpPr/>
-        <p:nvPr/>
-      </p:nvGrpSpPr>
-      <p:grpSpPr>
-        <a:xfrm>
-          <a:off x="0" y="0"/>
-          <a:ext cx="0" cy="0"/>
-          <a:chOff x="0" y="0"/>
-          <a:chExt cx="0" cy="0"/>
-        </a:xfrm>
-      </p:grpSpPr>
-      <p:sp>
-        <p:nvSpPr>
-          <p:cNvPr id="2" name="Titel 1"/>
-          <p:cNvSpPr>
-            <a:spLocks noGrp="1"/>
-          </p:cNvSpPr>
-          <p:nvPr>
-            <p:ph type="title"/>
-          </p:nvPr>
-        </p:nvSpPr>
-        <p:spPr/>
-        <p:txBody>
-          <a:bodyPr/>
-          <a:lstStyle/>
-          <a:p>
-            <a:r>
-              <a:rPr lang="de-DE" dirty="0"/>
-              <a:t> </a:t>
-            </a:r>
-            <a:br>
-              <a:rPr lang="de-DE" dirty="0"/>
-            </a:br>
-            <a:r>
-              <a:rPr lang="de-DE" dirty="0"/>
-              <a:t>Products </a:t>
-            </a:r>
-            <a:r>
-              <a:rPr lang="de-DE" dirty="0" err="1"/>
-              <a:t>for</a:t>
-            </a:r>
-            <a:r>
-              <a:rPr lang="de-DE" dirty="0"/>
-              <a:t> </a:t>
-            </a:r>
-            <a:r>
-              <a:rPr lang="de-DE" dirty="0" err="1"/>
-              <a:t>people</a:t>
-            </a:r>
-            <a:br>
-              <a:rPr lang="de-DE" dirty="0"/>
-            </a:br>
-            <a:r>
-              <a:rPr lang="de-DE" dirty="0"/>
-              <a:t>Products </a:t>
-            </a:r>
-            <a:r>
-              <a:rPr lang="de-DE" dirty="0" err="1"/>
-              <a:t>for</a:t>
-            </a:r>
-            <a:r>
-              <a:rPr lang="de-DE" dirty="0"/>
-              <a:t> YOU</a:t>
-            </a:r>
-          </a:p>
-        </p:txBody>
-      </p:sp>
-      <p:sp>
-        <p:nvSpPr>
-          <p:cNvPr id="3" name="Textplatzhalter 2"/>
-          <p:cNvSpPr>
-            <a:spLocks noGrp="1"/>
-          </p:cNvSpPr>
-          <p:nvPr>
-            <p:ph type="body" idx="1"/>
-          </p:nvPr>
-        </p:nvSpPr>
-        <p:spPr/>
-        <p:txBody>
-          <a:bodyPr/>
-          <a:lstStyle/>
-          <a:p>
-            <a:pPr algn="l"/>
-            <a:r>
-              <a:rPr lang="de-DE" sz="1900" dirty="0" err="1"/>
-              <a:t>HackZurich</a:t>
-            </a:r>
-            <a:r>
-              <a:rPr lang="de-DE" sz="1900" dirty="0"/>
-              <a:t> 2016 . Team : Anton </a:t>
-            </a:r>
-            <a:r>
-              <a:rPr lang="de-DE" sz="1900" dirty="0" err="1"/>
-              <a:t>Dmitrijev</a:t>
-            </a:r>
-            <a:r>
-              <a:rPr lang="de-DE" sz="1900" dirty="0"/>
-              <a:t>, Dmitrij Burlak, Elisa </a:t>
-            </a:r>
-            <a:r>
-              <a:rPr lang="de-DE" sz="1900" dirty="0" err="1"/>
-              <a:t>Chiarelli</a:t>
-            </a:r>
-            <a:r>
-              <a:rPr lang="de-DE" sz="1900" dirty="0"/>
-              <a:t>, Melanie Langbein</a:t>
-            </a:r>
-          </a:p>
-        </p:txBody>
-      </p:sp>
-      <p:sp>
-        <p:nvSpPr>
-          <p:cNvPr id="4" name="Textfeld 3"/>
-          <p:cNvSpPr txBox="1"/>
-          <p:nvPr/>
-        </p:nvSpPr>
-        <p:spPr>
-          <a:xfrm>
-            <a:off x="14285" y="35495"/>
-            <a:ext cx="4214813" cy="1015663"/>
-          </a:xfrm>
-          <a:prstGeom prst="rect">
-            <a:avLst/>
-          </a:prstGeom>
-          <a:noFill/>
-        </p:spPr>
-        <p:txBody>
-          <a:bodyPr wrap="square" rtlCol="0">
-            <a:spAutoFit/>
-          </a:bodyPr>
-          <a:lstStyle/>
-          <a:p>
-            <a:r>
-              <a:rPr lang="de-DE" sz="4800" b="1" dirty="0">
-                <a:solidFill>
-                  <a:srgbClr val="FEFEFE"/>
-                </a:solidFill>
-                <a:ea typeface="+mj-ea"/>
-                <a:cs typeface="+mj-cs"/>
-              </a:rPr>
-              <a:t>RIS</a:t>
-            </a:r>
-            <a:r>
-              <a:rPr lang="de-DE" sz="6000" b="1" dirty="0">
-                <a:solidFill>
-                  <a:srgbClr val="FF0000"/>
-                </a:solidFill>
-                <a:ea typeface="+mj-ea"/>
-                <a:cs typeface="+mj-cs"/>
-              </a:rPr>
-              <a:t>K</a:t>
-            </a:r>
-            <a:r>
-              <a:rPr lang="de-DE" sz="4800" b="1" dirty="0">
-                <a:solidFill>
-                  <a:srgbClr val="FEFEFE"/>
-                </a:solidFill>
-                <a:ea typeface="+mj-ea"/>
-                <a:cs typeface="+mj-cs"/>
-              </a:rPr>
-              <a:t>OGNIZE</a:t>
-            </a:r>
-            <a:endParaRPr lang="en-US" dirty="0"/>
-          </a:p>
-        </p:txBody>
-      </p:sp>
-    </p:spTree>
-    <p:extLst>
-      <p:ext uri="{BB962C8B-B14F-4D97-AF65-F5344CB8AC3E}">
-        <p14:creationId xmlns:p14="http://schemas.microsoft.com/office/powerpoint/2010/main" val="1446886937"/>
-      </p:ext>
-    </p:extLst>
-  </p:cSld>
-  <p:clrMapOvr>
-    <a:masterClrMapping/>
-  </p:clrMapOvr>
+  <p:timing>
+    <p:tnLst>
+      <p:par>
+        <p:cTn id="1" dur="indefinite" restart="never" nodeType="tmRoot">
+          <p:childTnLst>
+            <p:seq concurrent="1" nextAc="seek">
+              <p:cTn id="2" dur="indefinite" nodeType="mainSeq">
+                <p:childTnLst>
+                  <p:par>
+                    <p:cTn id="3" fill="hold">
+                      <p:stCondLst>
+                        <p:cond delay="indefinite"/>
+                      </p:stCondLst>
+                      <p:childTnLst>
+                        <p:par>
+                          <p:cTn id="4" fill="hold">
+                            <p:stCondLst>
+                              <p:cond delay="0"/>
+                            </p:stCondLst>
+                            <p:childTnLst>
+                              <p:par>
+                                <p:cTn id="5" presetID="1" presetClass="entr" presetSubtype="0" fill="hold" nodeType="clickEffect">
+                                  <p:stCondLst>
+                                    <p:cond delay="0"/>
+                                  </p:stCondLst>
+                                  <p:childTnLst>
+                                    <p:set>
+                                      <p:cBhvr>
+                                        <p:cTn id="6" dur="1" fill="hold">
+                                          <p:stCondLst>
+                                            <p:cond delay="0"/>
+                                          </p:stCondLst>
+                                        </p:cTn>
+                                        <p:tgtEl>
+                                          <p:spTgt spid="9"/>
+                                        </p:tgtEl>
+                                        <p:attrNameLst>
+                                          <p:attrName>style.visibility</p:attrName>
+                                        </p:attrNameLst>
+                                      </p:cBhvr>
+                                      <p:to>
+                                        <p:strVal val="visible"/>
+                                      </p:to>
+                                    </p:set>
+                                  </p:childTnLst>
+                                </p:cTn>
+                              </p:par>
+                            </p:childTnLst>
+                          </p:cTn>
+                        </p:par>
+                      </p:childTnLst>
+                    </p:cTn>
+                  </p:par>
+                </p:childTnLst>
+              </p:cTn>
+              <p:prevCondLst>
+                <p:cond evt="onPrev" delay="0">
+                  <p:tgtEl>
+                    <p:sldTgt/>
+                  </p:tgtEl>
+                </p:cond>
+              </p:prevCondLst>
+              <p:nextCondLst>
+                <p:cond evt="onNext" delay="0">
+                  <p:tgtEl>
+                    <p:sldTgt/>
+                  </p:tgtEl>
+                </p:cond>
+              </p:nextCondLst>
+            </p:seq>
+          </p:childTnLst>
+        </p:cTn>
+      </p:par>
+    </p:tnLst>
+  </p:timing>
 </p:sld>
 </file>
 

</xml_diff>